<commit_message>
Added doc TODO DI container
</commit_message>
<xml_diff>
--- a/stonehengeChromely.pptx
+++ b/stonehengeChromely.pptx
@@ -226,7 +226,7 @@
           <a:p>
             <a:fld id="{48876805-D814-49AD-A4D2-A14BF4375319}" type="datetimeFigureOut">
               <a:rPr lang="de-DE" smtClean="0"/>
-              <a:t>03.07.2019</a:t>
+              <a:t>18.07.2019</a:t>
             </a:fld>
             <a:endParaRPr lang="de-DE"/>
           </a:p>
@@ -3349,7 +3349,7 @@
           <a:p>
             <a:fld id="{79FE5C41-353F-4262-932C-7692C85C322C}" type="datetimeFigureOut">
               <a:rPr lang="de-DE" smtClean="0"/>
-              <a:t>03.07.2019</a:t>
+              <a:t>18.07.2019</a:t>
             </a:fld>
             <a:endParaRPr lang="de-DE"/>
           </a:p>
@@ -3547,7 +3547,7 @@
           <a:p>
             <a:fld id="{79FE5C41-353F-4262-932C-7692C85C322C}" type="datetimeFigureOut">
               <a:rPr lang="de-DE" smtClean="0"/>
-              <a:t>03.07.2019</a:t>
+              <a:t>18.07.2019</a:t>
             </a:fld>
             <a:endParaRPr lang="de-DE"/>
           </a:p>
@@ -3755,7 +3755,7 @@
           <a:p>
             <a:fld id="{79FE5C41-353F-4262-932C-7692C85C322C}" type="datetimeFigureOut">
               <a:rPr lang="de-DE" smtClean="0"/>
-              <a:t>03.07.2019</a:t>
+              <a:t>18.07.2019</a:t>
             </a:fld>
             <a:endParaRPr lang="de-DE"/>
           </a:p>
@@ -3953,7 +3953,7 @@
           <a:p>
             <a:fld id="{79FE5C41-353F-4262-932C-7692C85C322C}" type="datetimeFigureOut">
               <a:rPr lang="de-DE" smtClean="0"/>
-              <a:t>03.07.2019</a:t>
+              <a:t>18.07.2019</a:t>
             </a:fld>
             <a:endParaRPr lang="de-DE"/>
           </a:p>
@@ -4228,7 +4228,7 @@
           <a:p>
             <a:fld id="{79FE5C41-353F-4262-932C-7692C85C322C}" type="datetimeFigureOut">
               <a:rPr lang="de-DE" smtClean="0"/>
-              <a:t>03.07.2019</a:t>
+              <a:t>18.07.2019</a:t>
             </a:fld>
             <a:endParaRPr lang="de-DE"/>
           </a:p>
@@ -4493,7 +4493,7 @@
           <a:p>
             <a:fld id="{79FE5C41-353F-4262-932C-7692C85C322C}" type="datetimeFigureOut">
               <a:rPr lang="de-DE" smtClean="0"/>
-              <a:t>03.07.2019</a:t>
+              <a:t>18.07.2019</a:t>
             </a:fld>
             <a:endParaRPr lang="de-DE"/>
           </a:p>
@@ -4905,7 +4905,7 @@
           <a:p>
             <a:fld id="{79FE5C41-353F-4262-932C-7692C85C322C}" type="datetimeFigureOut">
               <a:rPr lang="de-DE" smtClean="0"/>
-              <a:t>03.07.2019</a:t>
+              <a:t>18.07.2019</a:t>
             </a:fld>
             <a:endParaRPr lang="de-DE"/>
           </a:p>
@@ -5046,7 +5046,7 @@
           <a:p>
             <a:fld id="{79FE5C41-353F-4262-932C-7692C85C322C}" type="datetimeFigureOut">
               <a:rPr lang="de-DE" smtClean="0"/>
-              <a:t>03.07.2019</a:t>
+              <a:t>18.07.2019</a:t>
             </a:fld>
             <a:endParaRPr lang="de-DE"/>
           </a:p>
@@ -5159,7 +5159,7 @@
           <a:p>
             <a:fld id="{79FE5C41-353F-4262-932C-7692C85C322C}" type="datetimeFigureOut">
               <a:rPr lang="de-DE" smtClean="0"/>
-              <a:t>03.07.2019</a:t>
+              <a:t>18.07.2019</a:t>
             </a:fld>
             <a:endParaRPr lang="de-DE"/>
           </a:p>
@@ -5470,7 +5470,7 @@
           <a:p>
             <a:fld id="{79FE5C41-353F-4262-932C-7692C85C322C}" type="datetimeFigureOut">
               <a:rPr lang="de-DE" smtClean="0"/>
-              <a:t>03.07.2019</a:t>
+              <a:t>18.07.2019</a:t>
             </a:fld>
             <a:endParaRPr lang="de-DE"/>
           </a:p>
@@ -5758,7 +5758,7 @@
           <a:p>
             <a:fld id="{79FE5C41-353F-4262-932C-7692C85C322C}" type="datetimeFigureOut">
               <a:rPr lang="de-DE" smtClean="0"/>
-              <a:t>03.07.2019</a:t>
+              <a:t>18.07.2019</a:t>
             </a:fld>
             <a:endParaRPr lang="de-DE"/>
           </a:p>
@@ -5999,7 +5999,7 @@
           <a:p>
             <a:fld id="{79FE5C41-353F-4262-932C-7692C85C322C}" type="datetimeFigureOut">
               <a:rPr lang="de-DE" smtClean="0"/>
-              <a:t>03.07.2019</a:t>
+              <a:t>18.07.2019</a:t>
             </a:fld>
             <a:endParaRPr lang="de-DE"/>
           </a:p>
@@ -9348,6 +9348,20 @@
               <a:rPr lang="de-DE" dirty="0" err="1"/>
               <a:t>handling</a:t>
             </a:r>
+            <a:endParaRPr lang="de-DE" dirty="0"/>
+          </a:p>
+          <a:p>
+            <a:r>
+              <a:rPr lang="de-DE" dirty="0"/>
+              <a:t>DI Container _</a:t>
+            </a:r>
+            <a:r>
+              <a:rPr lang="de-DE" dirty="0" err="1"/>
+              <a:t>loader.Services</a:t>
+            </a:r>
+            <a:endParaRPr lang="de-DE"/>
+          </a:p>
+          <a:p>
             <a:endParaRPr lang="de-DE" dirty="0"/>
           </a:p>
           <a:p>

</xml_diff>